<commit_message>
code style improvements of the demo R script
</commit_message>
<xml_diff>
--- a/figures.pptx
+++ b/figures.pptx
@@ -2964,6 +2964,29 @@
           <a:chExt cx="0" cy="0"/>
         </a:xfrm>
       </p:grpSpPr>
+      <p:sp>
+        <p:nvSpPr>
+          <p:cNvPr id="4" name="Title 3"/>
+          <p:cNvSpPr>
+            <a:spLocks noGrp="1"/>
+          </p:cNvSpPr>
+          <p:nvPr>
+            <p:ph type="title"/>
+          </p:nvPr>
+        </p:nvSpPr>
+        <p:spPr/>
+        <p:txBody>
+          <a:bodyPr/>
+          <a:lstStyle/>
+          <a:p>
+            <a:r>
+              <a:rPr lang="en-US" dirty="0" smtClean="0"/>
+              <a:t>Model Diagram</a:t>
+            </a:r>
+            <a:endParaRPr lang="en-US" dirty="0"/>
+          </a:p>
+        </p:txBody>
+      </p:sp>
     </p:spTree>
     <p:extLst>
       <p:ext uri="{BB962C8B-B14F-4D97-AF65-F5344CB8AC3E}">

</xml_diff>